<commit_message>
added models for certificate database, updated script to handle Api request- Achieved Alpha version
</commit_message>
<xml_diff>
--- a/certificate_templates/blank_slide.pptx
+++ b/certificate_templates/blank_slide.pptx
@@ -309,7 +309,7 @@
             <a:fld id="{1D8BD707-D9CF-40AE-B4C6-C98DA3205C09}" type="datetimeFigureOut">
               <a:rPr lang="en-US" smtClean="0"/>
               <a:pPr/>
-              <a:t>9/26/2024</a:t>
+              <a:t>10/2/2024</a:t>
             </a:fld>
             <a:endParaRPr lang="en-US"/>
           </a:p>
@@ -474,7 +474,7 @@
             <a:fld id="{1D8BD707-D9CF-40AE-B4C6-C98DA3205C09}" type="datetimeFigureOut">
               <a:rPr lang="en-US" smtClean="0"/>
               <a:pPr/>
-              <a:t>9/26/2024</a:t>
+              <a:t>10/2/2024</a:t>
             </a:fld>
             <a:endParaRPr lang="en-US"/>
           </a:p>
@@ -649,7 +649,7 @@
             <a:fld id="{1D8BD707-D9CF-40AE-B4C6-C98DA3205C09}" type="datetimeFigureOut">
               <a:rPr lang="en-US" smtClean="0"/>
               <a:pPr/>
-              <a:t>9/26/2024</a:t>
+              <a:t>10/2/2024</a:t>
             </a:fld>
             <a:endParaRPr lang="en-US"/>
           </a:p>
@@ -814,7 +814,7 @@
             <a:fld id="{1D8BD707-D9CF-40AE-B4C6-C98DA3205C09}" type="datetimeFigureOut">
               <a:rPr lang="en-US" smtClean="0"/>
               <a:pPr/>
-              <a:t>9/26/2024</a:t>
+              <a:t>10/2/2024</a:t>
             </a:fld>
             <a:endParaRPr lang="en-US"/>
           </a:p>
@@ -1056,7 +1056,7 @@
             <a:fld id="{1D8BD707-D9CF-40AE-B4C6-C98DA3205C09}" type="datetimeFigureOut">
               <a:rPr lang="en-US" smtClean="0"/>
               <a:pPr/>
-              <a:t>9/26/2024</a:t>
+              <a:t>10/2/2024</a:t>
             </a:fld>
             <a:endParaRPr lang="en-US"/>
           </a:p>
@@ -1338,7 +1338,7 @@
             <a:fld id="{1D8BD707-D9CF-40AE-B4C6-C98DA3205C09}" type="datetimeFigureOut">
               <a:rPr lang="en-US" smtClean="0"/>
               <a:pPr/>
-              <a:t>9/26/2024</a:t>
+              <a:t>10/2/2024</a:t>
             </a:fld>
             <a:endParaRPr lang="en-US"/>
           </a:p>
@@ -1754,7 +1754,7 @@
             <a:fld id="{1D8BD707-D9CF-40AE-B4C6-C98DA3205C09}" type="datetimeFigureOut">
               <a:rPr lang="en-US" smtClean="0"/>
               <a:pPr/>
-              <a:t>9/26/2024</a:t>
+              <a:t>10/2/2024</a:t>
             </a:fld>
             <a:endParaRPr lang="en-US"/>
           </a:p>
@@ -1868,7 +1868,7 @@
             <a:fld id="{1D8BD707-D9CF-40AE-B4C6-C98DA3205C09}" type="datetimeFigureOut">
               <a:rPr lang="en-US" smtClean="0"/>
               <a:pPr/>
-              <a:t>9/26/2024</a:t>
+              <a:t>10/2/2024</a:t>
             </a:fld>
             <a:endParaRPr lang="en-US"/>
           </a:p>
@@ -1960,7 +1960,7 @@
             <a:fld id="{1D8BD707-D9CF-40AE-B4C6-C98DA3205C09}" type="datetimeFigureOut">
               <a:rPr lang="en-US" smtClean="0"/>
               <a:pPr/>
-              <a:t>9/26/2024</a:t>
+              <a:t>10/2/2024</a:t>
             </a:fld>
             <a:endParaRPr lang="en-US"/>
           </a:p>
@@ -2232,7 +2232,7 @@
             <a:fld id="{1D8BD707-D9CF-40AE-B4C6-C98DA3205C09}" type="datetimeFigureOut">
               <a:rPr lang="en-US" smtClean="0"/>
               <a:pPr/>
-              <a:t>9/26/2024</a:t>
+              <a:t>10/2/2024</a:t>
             </a:fld>
             <a:endParaRPr lang="en-US"/>
           </a:p>
@@ -2481,7 +2481,7 @@
             <a:fld id="{1D8BD707-D9CF-40AE-B4C6-C98DA3205C09}" type="datetimeFigureOut">
               <a:rPr lang="en-US" smtClean="0"/>
               <a:pPr/>
-              <a:t>9/26/2024</a:t>
+              <a:t>10/2/2024</a:t>
             </a:fld>
             <a:endParaRPr lang="en-US"/>
           </a:p>
@@ -2689,7 +2689,7 @@
             <a:fld id="{1D8BD707-D9CF-40AE-B4C6-C98DA3205C09}" type="datetimeFigureOut">
               <a:rPr lang="en-US" smtClean="0"/>
               <a:pPr/>
-              <a:t>9/26/2024</a:t>
+              <a:t>10/2/2024</a:t>
             </a:fld>
             <a:endParaRPr lang="en-US"/>
           </a:p>
@@ -3609,7 +3609,7 @@
         </p:nvSpPr>
         <p:spPr>
           <a:xfrm>
-            <a:off x="-525417" y="6272174"/>
+            <a:off x="-3473633" y="6272174"/>
             <a:ext cx="10026833" cy="214674"/>
           </a:xfrm>
           <a:prstGeom prst="rect">
@@ -3637,32 +3637,17 @@
                 <a:cs typeface="Canva Sans"/>
                 <a:sym typeface="Canva Sans"/>
               </a:rPr>
-              <a:t>*Verify this certificate at: </a:t>
-            </a:r>
-            <a:r>
-              <a:rPr lang="en-US" sz="1256" dirty="0">
-                <a:solidFill>
-                  <a:srgbClr val="5271FF"/>
-                </a:solidFill>
-                <a:latin typeface="Alice" pitchFamily="2" charset="0"/>
-                <a:ea typeface="Alice" pitchFamily="2" charset="0"/>
-                <a:cs typeface="Canva Sans"/>
-                <a:sym typeface="Canva Sans"/>
-              </a:rPr>
-              <a:t>                                                                                                   </a:t>
-            </a:r>
-            <a:r>
-              <a:rPr lang="en-US" sz="1256" dirty="0">
-                <a:solidFill>
-                  <a:srgbClr val="000000"/>
-                </a:solidFill>
-                <a:latin typeface="Alice" pitchFamily="2" charset="0"/>
-                <a:ea typeface="Alice" pitchFamily="2" charset="0"/>
-                <a:cs typeface="Canva Sans"/>
-                <a:sym typeface="Canva Sans"/>
-              </a:rPr>
-              <a:t>or Scan the above QR code</a:t>
-            </a:r>
+              <a:t>*Verify this certificate at:</a:t>
+            </a:r>
+            <a:endParaRPr lang="en-US" sz="1256" dirty="0">
+              <a:solidFill>
+                <a:srgbClr val="000000"/>
+              </a:solidFill>
+              <a:latin typeface="Alice" pitchFamily="2" charset="0"/>
+              <a:ea typeface="Alice" pitchFamily="2" charset="0"/>
+              <a:cs typeface="Canva Sans"/>
+              <a:sym typeface="Canva Sans"/>
+            </a:endParaRPr>
           </a:p>
         </p:txBody>
       </p:sp>
@@ -3781,6 +3766,91 @@
           </a:prstGeom>
         </p:spPr>
       </p:pic>
+      <p:sp>
+        <p:nvSpPr>
+          <p:cNvPr id="10" name="TextBox 9">
+            <a:extLst>
+              <a:ext uri="{FF2B5EF4-FFF2-40B4-BE49-F238E27FC236}">
+                <a16:creationId xmlns:a16="http://schemas.microsoft.com/office/drawing/2014/main" id="{DA403E30-8B34-4D38-6F88-FC3856D2F468}"/>
+              </a:ext>
+            </a:extLst>
+          </p:cNvPr>
+          <p:cNvSpPr txBox="1"/>
+          <p:nvPr/>
+        </p:nvSpPr>
+        <p:spPr>
+          <a:xfrm>
+            <a:off x="868680" y="5486400"/>
+            <a:ext cx="7513320" cy="534121"/>
+          </a:xfrm>
+          <a:prstGeom prst="rect">
+            <a:avLst/>
+          </a:prstGeom>
+          <a:noFill/>
+        </p:spPr>
+        <p:txBody>
+          <a:bodyPr wrap="square">
+            <a:spAutoFit/>
+          </a:bodyPr>
+          <a:lstStyle/>
+          <a:p>
+            <a:pPr algn="ctr">
+              <a:lnSpc>
+                <a:spcPts val="1759"/>
+              </a:lnSpc>
+            </a:pPr>
+            <a:r>
+              <a:rPr lang="en-US" sz="1200">
+                <a:solidFill>
+                  <a:srgbClr val="000000"/>
+                </a:solidFill>
+                <a:latin typeface="Alice" pitchFamily="2" charset="0"/>
+                <a:ea typeface="Alice" pitchFamily="2" charset="0"/>
+                <a:cs typeface="Canva Sans"/>
+                <a:sym typeface="Canva Sans"/>
+              </a:rPr>
+              <a:t>Certificate </a:t>
+            </a:r>
+            <a:endParaRPr lang="en-US" sz="1200" dirty="0">
+              <a:solidFill>
+                <a:srgbClr val="000000"/>
+              </a:solidFill>
+              <a:latin typeface="Alice" pitchFamily="2" charset="0"/>
+              <a:ea typeface="Alice" pitchFamily="2" charset="0"/>
+              <a:cs typeface="Canva Sans"/>
+              <a:sym typeface="Canva Sans"/>
+            </a:endParaRPr>
+          </a:p>
+          <a:p>
+            <a:pPr algn="ctr">
+              <a:lnSpc>
+                <a:spcPts val="1759"/>
+              </a:lnSpc>
+            </a:pPr>
+            <a:r>
+              <a:rPr lang="en-US" sz="1200">
+                <a:solidFill>
+                  <a:srgbClr val="000000"/>
+                </a:solidFill>
+                <a:latin typeface="Alice" pitchFamily="2" charset="0"/>
+                <a:ea typeface="Alice" pitchFamily="2" charset="0"/>
+                <a:cs typeface="Canva Sans"/>
+                <a:sym typeface="Canva Sans"/>
+              </a:rPr>
+              <a:t>Credentials</a:t>
+            </a:r>
+            <a:endParaRPr lang="en-US" sz="1200" dirty="0">
+              <a:solidFill>
+                <a:srgbClr val="000000"/>
+              </a:solidFill>
+              <a:latin typeface="Alice" pitchFamily="2" charset="0"/>
+              <a:ea typeface="Alice" pitchFamily="2" charset="0"/>
+              <a:cs typeface="Canva Sans"/>
+              <a:sym typeface="Canva Sans"/>
+            </a:endParaRPr>
+          </a:p>
+        </p:txBody>
+      </p:sp>
     </p:spTree>
   </p:cSld>
   <p:clrMapOvr>

</xml_diff>

<commit_message>
added scheduler for background report generation, added more database queries
</commit_message>
<xml_diff>
--- a/certificate_templates/blank_slide.pptx
+++ b/certificate_templates/blank_slide.pptx
@@ -3780,7 +3780,7 @@
         </p:nvSpPr>
         <p:spPr>
           <a:xfrm>
-            <a:off x="868680" y="5486400"/>
+            <a:off x="792480" y="5638800"/>
             <a:ext cx="7513320" cy="534121"/>
           </a:xfrm>
           <a:prstGeom prst="rect">
@@ -3800,7 +3800,7 @@
               </a:lnSpc>
             </a:pPr>
             <a:r>
-              <a:rPr lang="en-US" sz="1200">
+              <a:rPr lang="en-US" sz="1200" dirty="0">
                 <a:solidFill>
                   <a:srgbClr val="000000"/>
                 </a:solidFill>
@@ -3809,17 +3809,8 @@
                 <a:cs typeface="Canva Sans"/>
                 <a:sym typeface="Canva Sans"/>
               </a:rPr>
-              <a:t>Certificate </a:t>
-            </a:r>
-            <a:endParaRPr lang="en-US" sz="1200" dirty="0">
-              <a:solidFill>
-                <a:srgbClr val="000000"/>
-              </a:solidFill>
-              <a:latin typeface="Alice" pitchFamily="2" charset="0"/>
-              <a:ea typeface="Alice" pitchFamily="2" charset="0"/>
-              <a:cs typeface="Canva Sans"/>
-              <a:sym typeface="Canva Sans"/>
-            </a:endParaRPr>
+              <a:t>Scan the above</a:t>
+            </a:r>
           </a:p>
           <a:p>
             <a:pPr algn="ctr">
@@ -3828,7 +3819,7 @@
               </a:lnSpc>
             </a:pPr>
             <a:r>
-              <a:rPr lang="en-US" sz="1200">
+              <a:rPr lang="en-US" sz="1200" dirty="0">
                 <a:solidFill>
                   <a:srgbClr val="000000"/>
                 </a:solidFill>
@@ -3837,17 +3828,8 @@
                 <a:cs typeface="Canva Sans"/>
                 <a:sym typeface="Canva Sans"/>
               </a:rPr>
-              <a:t>Credentials</a:t>
-            </a:r>
-            <a:endParaRPr lang="en-US" sz="1200" dirty="0">
-              <a:solidFill>
-                <a:srgbClr val="000000"/>
-              </a:solidFill>
-              <a:latin typeface="Alice" pitchFamily="2" charset="0"/>
-              <a:ea typeface="Alice" pitchFamily="2" charset="0"/>
-              <a:cs typeface="Canva Sans"/>
-              <a:sym typeface="Canva Sans"/>
-            </a:endParaRPr>
+              <a:t>QR credentials</a:t>
+            </a:r>
           </a:p>
         </p:txBody>
       </p:sp>

</xml_diff>